<commit_message>
lstm and exog vrb
</commit_message>
<xml_diff>
--- a/Images/VIX Index.pptx
+++ b/Images/VIX Index.pptx
@@ -10722,6 +10722,1934 @@
               </a:rPr>
               <a:t>APPENDIX</a:t>
             </a:r>
+          </a:p>
+          <a:p>
+            <a:pPr algn="ctr">
+              <a:buSzPts val="2400"/>
+            </a:pPr>
+            <a:endParaRPr lang="en-US" sz="2400" dirty="0">
+              <a:solidFill>
+                <a:srgbClr val="9900FF"/>
+              </a:solidFill>
+              <a:latin typeface="Muli"/>
+              <a:sym typeface="Muli"/>
+            </a:endParaRPr>
+          </a:p>
+          <a:p>
+            <a:pPr algn="ctr">
+              <a:buSzPts val="2400"/>
+            </a:pPr>
+            <a:r>
+              <a:rPr lang="en-US" sz="2400" dirty="0">
+                <a:solidFill>
+                  <a:srgbClr val="9900FF"/>
+                </a:solidFill>
+                <a:latin typeface="Muli"/>
+                <a:sym typeface="Muli"/>
+              </a:rPr>
+              <a:t># Volatility Index Enabled Trading Alert System #</a:t>
+            </a:r>
+          </a:p>
+          <a:p>
+            <a:pPr algn="ctr">
+              <a:buSzPts val="2400"/>
+            </a:pPr>
+            <a:endParaRPr lang="en-US" sz="2400" dirty="0">
+              <a:solidFill>
+                <a:srgbClr val="9900FF"/>
+              </a:solidFill>
+              <a:latin typeface="Muli"/>
+              <a:sym typeface="Muli"/>
+            </a:endParaRPr>
+          </a:p>
+          <a:p>
+            <a:pPr algn="ctr">
+              <a:buSzPts val="2400"/>
+            </a:pPr>
+            <a:r>
+              <a:rPr lang="en-US" sz="2400" dirty="0">
+                <a:solidFill>
+                  <a:srgbClr val="9900FF"/>
+                </a:solidFill>
+                <a:latin typeface="Muli"/>
+                <a:sym typeface="Muli"/>
+              </a:rPr>
+              <a:t>### Business Case ###</a:t>
+            </a:r>
+          </a:p>
+          <a:p>
+            <a:pPr algn="ctr">
+              <a:buSzPts val="2400"/>
+            </a:pPr>
+            <a:r>
+              <a:rPr lang="en-US" sz="2400" dirty="0">
+                <a:solidFill>
+                  <a:srgbClr val="9900FF"/>
+                </a:solidFill>
+                <a:latin typeface="Muli"/>
+                <a:sym typeface="Muli"/>
+              </a:rPr>
+              <a:t>The world is living through its 2nd pandemic of 21st Century (first being 2009 H1N1 influenza pandemic). In midst of all this doom and stock market gyrations, one category of investors has stood tall and more often than not only beaten established mutual funds and hedge funds. More and more news headlines attest to this fact as we enter the 2nd half of 2020</a:t>
+            </a:r>
+          </a:p>
+          <a:p>
+            <a:pPr algn="ctr">
+              <a:buSzPts val="2400"/>
+            </a:pPr>
+            <a:endParaRPr lang="en-US" sz="2400" dirty="0">
+              <a:solidFill>
+                <a:srgbClr val="9900FF"/>
+              </a:solidFill>
+              <a:latin typeface="Muli"/>
+              <a:sym typeface="Muli"/>
+            </a:endParaRPr>
+          </a:p>
+          <a:p>
+            <a:pPr algn="ctr">
+              <a:buSzPts val="2400"/>
+            </a:pPr>
+            <a:r>
+              <a:rPr lang="en-US" sz="2400" dirty="0">
+                <a:solidFill>
+                  <a:srgbClr val="9900FF"/>
+                </a:solidFill>
+                <a:latin typeface="Muli"/>
+                <a:sym typeface="Muli"/>
+              </a:rPr>
+              <a:t>As the current crises continues to increase volatility due to conflicting progress against COVID-19 and a monumental Presidential election around the corner, its </a:t>
+            </a:r>
+            <a:r>
+              <a:rPr lang="en-US" sz="2400" dirty="0" err="1">
+                <a:solidFill>
+                  <a:srgbClr val="9900FF"/>
+                </a:solidFill>
+                <a:latin typeface="Muli"/>
+                <a:sym typeface="Muli"/>
+              </a:rPr>
+              <a:t>imperitive</a:t>
+            </a:r>
+            <a:r>
+              <a:rPr lang="en-US" sz="2400" dirty="0">
+                <a:solidFill>
+                  <a:srgbClr val="9900FF"/>
+                </a:solidFill>
+                <a:latin typeface="Muli"/>
+                <a:sym typeface="Muli"/>
+              </a:rPr>
+              <a:t> that small mom/pop trader better understand volatility and utilize cutting edge data science techniques to forecast expected volatility and incorporate these insights regarding volatility into stock-trading behavior</a:t>
+            </a:r>
+          </a:p>
+          <a:p>
+            <a:pPr algn="ctr">
+              <a:buSzPts val="2400"/>
+            </a:pPr>
+            <a:endParaRPr lang="en-US" sz="2400" dirty="0">
+              <a:solidFill>
+                <a:srgbClr val="9900FF"/>
+              </a:solidFill>
+              <a:latin typeface="Muli"/>
+              <a:sym typeface="Muli"/>
+            </a:endParaRPr>
+          </a:p>
+          <a:p>
+            <a:pPr algn="ctr">
+              <a:buSzPts val="2400"/>
+            </a:pPr>
+            <a:r>
+              <a:rPr lang="en-US" sz="2400" dirty="0">
+                <a:solidFill>
+                  <a:srgbClr val="9900FF"/>
+                </a:solidFill>
+                <a:latin typeface="Muli"/>
+                <a:sym typeface="Muli"/>
+              </a:rPr>
+              <a:t>For most mom/pop investors focusing on investing in cyclicals like Technology stocks, valuations are increasing a function of sentiment and subject to '</a:t>
+            </a:r>
+            <a:r>
+              <a:rPr lang="en-US" sz="2400" dirty="0" err="1">
+                <a:solidFill>
+                  <a:srgbClr val="9900FF"/>
+                </a:solidFill>
+                <a:latin typeface="Muli"/>
+                <a:sym typeface="Muli"/>
+              </a:rPr>
+              <a:t>substiantial</a:t>
+            </a:r>
+            <a:r>
+              <a:rPr lang="en-US" sz="2400" dirty="0">
+                <a:solidFill>
+                  <a:srgbClr val="9900FF"/>
+                </a:solidFill>
+                <a:latin typeface="Muli"/>
+                <a:sym typeface="Muli"/>
+              </a:rPr>
+              <a:t>' change when other sectors of the economy recover </a:t>
+            </a:r>
+          </a:p>
+          <a:p>
+            <a:pPr algn="ctr">
+              <a:buSzPts val="2400"/>
+            </a:pPr>
+            <a:endParaRPr lang="en-US" sz="2400" dirty="0">
+              <a:solidFill>
+                <a:srgbClr val="9900FF"/>
+              </a:solidFill>
+              <a:latin typeface="Muli"/>
+              <a:sym typeface="Muli"/>
+            </a:endParaRPr>
+          </a:p>
+          <a:p>
+            <a:pPr algn="ctr">
+              <a:buSzPts val="2400"/>
+            </a:pPr>
+            <a:r>
+              <a:rPr lang="en-US" sz="2400" dirty="0">
+                <a:solidFill>
+                  <a:srgbClr val="9900FF"/>
+                </a:solidFill>
+                <a:latin typeface="Muli"/>
+                <a:sym typeface="Muli"/>
+              </a:rPr>
+              <a:t>We have all heard the maxim - 'buy when others sell and sell when others buy'. One literal </a:t>
+            </a:r>
+            <a:r>
+              <a:rPr lang="en-US" sz="2400" dirty="0" err="1">
+                <a:solidFill>
+                  <a:srgbClr val="9900FF"/>
+                </a:solidFill>
+                <a:latin typeface="Muli"/>
+                <a:sym typeface="Muli"/>
+              </a:rPr>
+              <a:t>intrepration</a:t>
+            </a:r>
+            <a:r>
+              <a:rPr lang="en-US" sz="2400" dirty="0">
+                <a:solidFill>
+                  <a:srgbClr val="9900FF"/>
+                </a:solidFill>
+                <a:latin typeface="Muli"/>
+                <a:sym typeface="Muli"/>
+              </a:rPr>
+              <a:t> of this maxim would be to buy when others are fearful and panicking and sell when others are overly </a:t>
+            </a:r>
+            <a:r>
+              <a:rPr lang="en-US" sz="2400" dirty="0" err="1">
+                <a:solidFill>
+                  <a:srgbClr val="9900FF"/>
+                </a:solidFill>
+                <a:latin typeface="Muli"/>
+                <a:sym typeface="Muli"/>
+              </a:rPr>
+              <a:t>europhic</a:t>
+            </a:r>
+            <a:r>
+              <a:rPr lang="en-US" sz="2400" dirty="0">
+                <a:solidFill>
+                  <a:srgbClr val="9900FF"/>
+                </a:solidFill>
+                <a:latin typeface="Muli"/>
+                <a:sym typeface="Muli"/>
+              </a:rPr>
+              <a:t> and start buying</a:t>
+            </a:r>
+          </a:p>
+          <a:p>
+            <a:pPr algn="ctr">
+              <a:buSzPts val="2400"/>
+            </a:pPr>
+            <a:endParaRPr lang="en-US" sz="2400" dirty="0">
+              <a:solidFill>
+                <a:srgbClr val="9900FF"/>
+              </a:solidFill>
+              <a:latin typeface="Muli"/>
+              <a:sym typeface="Muli"/>
+            </a:endParaRPr>
+          </a:p>
+          <a:p>
+            <a:pPr algn="ctr">
+              <a:buSzPts val="2400"/>
+            </a:pPr>
+            <a:r>
+              <a:rPr lang="en-US" sz="2400" dirty="0">
+                <a:solidFill>
+                  <a:srgbClr val="9900FF"/>
+                </a:solidFill>
+                <a:latin typeface="Muli"/>
+                <a:sym typeface="Muli"/>
+              </a:rPr>
+              <a:t>Clearly there is a use case for a volatility predictor which can be used to improve 'entry' and 'exit' strategies  </a:t>
+            </a:r>
+          </a:p>
+          <a:p>
+            <a:pPr algn="ctr">
+              <a:buSzPts val="2400"/>
+            </a:pPr>
+            <a:endParaRPr lang="en-US" sz="2400" dirty="0">
+              <a:solidFill>
+                <a:srgbClr val="9900FF"/>
+              </a:solidFill>
+              <a:latin typeface="Muli"/>
+              <a:sym typeface="Muli"/>
+            </a:endParaRPr>
+          </a:p>
+          <a:p>
+            <a:pPr algn="ctr">
+              <a:buSzPts val="2400"/>
+            </a:pPr>
+            <a:r>
+              <a:rPr lang="en-US" sz="2400" dirty="0">
+                <a:solidFill>
+                  <a:srgbClr val="9900FF"/>
+                </a:solidFill>
+                <a:latin typeface="Muli"/>
+                <a:sym typeface="Muli"/>
+              </a:rPr>
+              <a:t>While it is widely acknowledged that predicting asset prices is a perilous profession, I believe there maybe a workaround in trying to predict broader market volatility and explore if such insight can augment trading strategies in such times</a:t>
+            </a:r>
+          </a:p>
+          <a:p>
+            <a:pPr algn="ctr">
+              <a:buSzPts val="2400"/>
+            </a:pPr>
+            <a:endParaRPr lang="en-US" sz="2400" dirty="0">
+              <a:solidFill>
+                <a:srgbClr val="9900FF"/>
+              </a:solidFill>
+              <a:latin typeface="Muli"/>
+              <a:sym typeface="Muli"/>
+            </a:endParaRPr>
+          </a:p>
+          <a:p>
+            <a:pPr algn="ctr">
+              <a:buSzPts val="2400"/>
+            </a:pPr>
+            <a:r>
+              <a:rPr lang="en-US" sz="2400" dirty="0">
+                <a:solidFill>
+                  <a:srgbClr val="9900FF"/>
+                </a:solidFill>
+                <a:latin typeface="Muli"/>
+                <a:sym typeface="Muli"/>
+              </a:rPr>
+              <a:t>### Associated Sub-theme (For Stretch Goal) ###</a:t>
+            </a:r>
+          </a:p>
+          <a:p>
+            <a:pPr algn="ctr">
+              <a:buSzPts val="2400"/>
+            </a:pPr>
+            <a:endParaRPr lang="en-US" sz="2400" dirty="0">
+              <a:solidFill>
+                <a:srgbClr val="9900FF"/>
+              </a:solidFill>
+              <a:latin typeface="Muli"/>
+              <a:sym typeface="Muli"/>
+            </a:endParaRPr>
+          </a:p>
+          <a:p>
+            <a:pPr algn="ctr">
+              <a:buSzPts val="2400"/>
+            </a:pPr>
+            <a:r>
+              <a:rPr lang="en-US" sz="2400" dirty="0">
+                <a:solidFill>
+                  <a:srgbClr val="9900FF"/>
+                </a:solidFill>
+                <a:latin typeface="Muli"/>
+                <a:sym typeface="Muli"/>
+              </a:rPr>
+              <a:t>I also wanted to explore if investors experienced different levels of volatility under two Presidents and extract insights for a major upcoming event that will be 'cataclysmic' from a volatility standpoint - the 2020 Presidential Election - irrespective of who wins!</a:t>
+            </a:r>
+          </a:p>
+          <a:p>
+            <a:pPr algn="ctr">
+              <a:buSzPts val="2400"/>
+            </a:pPr>
+            <a:endParaRPr lang="en-US" sz="2400" dirty="0">
+              <a:solidFill>
+                <a:srgbClr val="9900FF"/>
+              </a:solidFill>
+              <a:latin typeface="Muli"/>
+              <a:sym typeface="Muli"/>
+            </a:endParaRPr>
+          </a:p>
+          <a:p>
+            <a:pPr algn="ctr">
+              <a:buSzPts val="2400"/>
+            </a:pPr>
+            <a:endParaRPr lang="en-US" sz="2400" dirty="0">
+              <a:solidFill>
+                <a:srgbClr val="9900FF"/>
+              </a:solidFill>
+              <a:latin typeface="Muli"/>
+              <a:sym typeface="Muli"/>
+            </a:endParaRPr>
+          </a:p>
+          <a:p>
+            <a:pPr algn="ctr">
+              <a:buSzPts val="2400"/>
+            </a:pPr>
+            <a:r>
+              <a:rPr lang="en-US" sz="2400" dirty="0">
+                <a:solidFill>
+                  <a:srgbClr val="9900FF"/>
+                </a:solidFill>
+                <a:latin typeface="Muli"/>
+                <a:sym typeface="Muli"/>
+              </a:rPr>
+              <a:t>### Using Data Science to Demystify/Understand Volatility ###</a:t>
+            </a:r>
+          </a:p>
+          <a:p>
+            <a:pPr algn="ctr">
+              <a:buSzPts val="2400"/>
+            </a:pPr>
+            <a:endParaRPr lang="en-US" sz="2400" dirty="0">
+              <a:solidFill>
+                <a:srgbClr val="9900FF"/>
+              </a:solidFill>
+              <a:latin typeface="Muli"/>
+              <a:sym typeface="Muli"/>
+            </a:endParaRPr>
+          </a:p>
+          <a:p>
+            <a:pPr algn="ctr">
+              <a:buSzPts val="2400"/>
+            </a:pPr>
+            <a:r>
+              <a:rPr lang="en-US" sz="2400" dirty="0">
+                <a:solidFill>
+                  <a:srgbClr val="9900FF"/>
+                </a:solidFill>
+                <a:latin typeface="Muli"/>
+                <a:sym typeface="Muli"/>
+              </a:rPr>
+              <a:t>While looking for data to best understand volatility for trading, I choose the CBOE Volatility Index (VIX) - VIX is widely acknowledged as the foremost indicator of implied market volatility for over 25 years</a:t>
+            </a:r>
+          </a:p>
+          <a:p>
+            <a:pPr algn="ctr">
+              <a:buSzPts val="2400"/>
+            </a:pPr>
+            <a:endParaRPr lang="en-US" sz="2400" dirty="0">
+              <a:solidFill>
+                <a:srgbClr val="9900FF"/>
+              </a:solidFill>
+              <a:latin typeface="Muli"/>
+              <a:sym typeface="Muli"/>
+            </a:endParaRPr>
+          </a:p>
+          <a:p>
+            <a:pPr algn="ctr">
+              <a:buSzPts val="2400"/>
+            </a:pPr>
+            <a:r>
+              <a:rPr lang="en-US" sz="2400" dirty="0">
+                <a:solidFill>
+                  <a:srgbClr val="9900FF"/>
+                </a:solidFill>
+                <a:latin typeface="Muli"/>
+                <a:sym typeface="Muli"/>
+              </a:rPr>
+              <a:t>So what is the VIX? Its a real-time market index that represents the market's expectation of 30-day forward-looking volatility. VIX estimates how volatile the market will be by aggregating the weighted prices of S&amp;P 500 puts and calls over a wide range of strike prices. More specifically, the VIX is calculated by looking at the midpoints of real-time S&amp;P 500 option bid and ask prices</a:t>
+            </a:r>
+          </a:p>
+          <a:p>
+            <a:pPr algn="ctr">
+              <a:buSzPts val="2400"/>
+            </a:pPr>
+            <a:endParaRPr lang="en-US" sz="2400" dirty="0">
+              <a:solidFill>
+                <a:srgbClr val="9900FF"/>
+              </a:solidFill>
+              <a:latin typeface="Muli"/>
+              <a:sym typeface="Muli"/>
+            </a:endParaRPr>
+          </a:p>
+          <a:p>
+            <a:pPr algn="ctr">
+              <a:buSzPts val="2400"/>
+            </a:pPr>
+            <a:r>
+              <a:rPr lang="en-US" sz="2400" dirty="0">
+                <a:solidFill>
+                  <a:srgbClr val="9900FF"/>
+                </a:solidFill>
+                <a:latin typeface="Muli"/>
+                <a:sym typeface="Muli"/>
+              </a:rPr>
+              <a:t>Why VIX - Unlike </a:t>
+            </a:r>
+            <a:r>
+              <a:rPr lang="en-US" sz="2400" dirty="0" err="1">
+                <a:solidFill>
+                  <a:srgbClr val="9900FF"/>
+                </a:solidFill>
+                <a:latin typeface="Muli"/>
+                <a:sym typeface="Muli"/>
+              </a:rPr>
+              <a:t>indiviual</a:t>
+            </a:r>
+            <a:r>
+              <a:rPr lang="en-US" sz="2400" dirty="0">
+                <a:solidFill>
+                  <a:srgbClr val="9900FF"/>
+                </a:solidFill>
+                <a:latin typeface="Muli"/>
+                <a:sym typeface="Muli"/>
+              </a:rPr>
+              <a:t> stocks in S&amp;P500 (and associated option chains) which may be undergoing some structural </a:t>
+            </a:r>
+            <a:r>
+              <a:rPr lang="en-US" sz="2400" dirty="0" err="1">
+                <a:solidFill>
+                  <a:srgbClr val="9900FF"/>
+                </a:solidFill>
+                <a:latin typeface="Muli"/>
+                <a:sym typeface="Muli"/>
+              </a:rPr>
+              <a:t>realingment</a:t>
+            </a:r>
+            <a:r>
+              <a:rPr lang="en-US" sz="2400" dirty="0">
+                <a:solidFill>
+                  <a:srgbClr val="9900FF"/>
+                </a:solidFill>
+                <a:latin typeface="Muli"/>
+                <a:sym typeface="Muli"/>
+              </a:rPr>
+              <a:t> (GE &amp; BOEING are classic examples), VIX is 'diversified' and 'balanced' number that most accurately estimates investor sentiment going into the future. Since VIX is derived from future price expectations for every stock on the S&amp;P500, it accurately captures the hedging strategies of large institutional players - which in turn impact current and future stock prices</a:t>
+            </a:r>
+          </a:p>
+          <a:p>
+            <a:pPr algn="ctr">
+              <a:buSzPts val="2400"/>
+            </a:pPr>
+            <a:endParaRPr lang="en-US" sz="2400" dirty="0">
+              <a:solidFill>
+                <a:srgbClr val="9900FF"/>
+              </a:solidFill>
+              <a:latin typeface="Muli"/>
+              <a:sym typeface="Muli"/>
+            </a:endParaRPr>
+          </a:p>
+          <a:p>
+            <a:pPr algn="ctr">
+              <a:buSzPts val="2400"/>
+            </a:pPr>
+            <a:r>
+              <a:rPr lang="en-US" sz="2400" dirty="0">
+                <a:solidFill>
+                  <a:srgbClr val="9900FF"/>
+                </a:solidFill>
+                <a:latin typeface="Muli"/>
+                <a:sym typeface="Muli"/>
+              </a:rPr>
+              <a:t>Key </a:t>
+            </a:r>
+            <a:r>
+              <a:rPr lang="en-US" sz="2400" dirty="0" err="1">
+                <a:solidFill>
+                  <a:srgbClr val="9900FF"/>
+                </a:solidFill>
+                <a:latin typeface="Muli"/>
+                <a:sym typeface="Muli"/>
+              </a:rPr>
+              <a:t>Charateristic</a:t>
+            </a:r>
+            <a:r>
+              <a:rPr lang="en-US" sz="2400" dirty="0">
+                <a:solidFill>
+                  <a:srgbClr val="9900FF"/>
+                </a:solidFill>
+                <a:latin typeface="Muli"/>
+                <a:sym typeface="Muli"/>
+              </a:rPr>
+              <a:t> of Index - 'Long Term Mean Reversion' - Simply put folks </a:t>
+            </a:r>
+            <a:r>
+              <a:rPr lang="en-US" sz="2400" dirty="0" err="1">
+                <a:solidFill>
+                  <a:srgbClr val="9900FF"/>
+                </a:solidFill>
+                <a:latin typeface="Muli"/>
+                <a:sym typeface="Muli"/>
+              </a:rPr>
+              <a:t>dont</a:t>
+            </a:r>
+            <a:r>
+              <a:rPr lang="en-US" sz="2400" dirty="0">
+                <a:solidFill>
+                  <a:srgbClr val="9900FF"/>
+                </a:solidFill>
+                <a:latin typeface="Muli"/>
+                <a:sym typeface="Muli"/>
+              </a:rPr>
+              <a:t> stay fearful for too long nor do they remain euphoric all the time to whatever happens (Clearly investors could also benefit from learning Zazen and other </a:t>
+            </a:r>
+            <a:r>
+              <a:rPr lang="en-US" sz="2400" dirty="0" err="1">
+                <a:solidFill>
+                  <a:srgbClr val="9900FF"/>
+                </a:solidFill>
+                <a:latin typeface="Muli"/>
+                <a:sym typeface="Muli"/>
+              </a:rPr>
+              <a:t>zen</a:t>
+            </a:r>
+            <a:r>
+              <a:rPr lang="en-US" sz="2400" dirty="0">
+                <a:solidFill>
+                  <a:srgbClr val="9900FF"/>
+                </a:solidFill>
+                <a:latin typeface="Muli"/>
+                <a:sym typeface="Muli"/>
+              </a:rPr>
+              <a:t> meditation techniques but I'll save that for a later blog about how to maintain equanimity during 'high-volatility' trading sessions)</a:t>
+            </a:r>
+          </a:p>
+          <a:p>
+            <a:pPr algn="ctr">
+              <a:buSzPts val="2400"/>
+            </a:pPr>
+            <a:endParaRPr lang="en-US" sz="2400" dirty="0">
+              <a:solidFill>
+                <a:srgbClr val="9900FF"/>
+              </a:solidFill>
+              <a:latin typeface="Muli"/>
+              <a:sym typeface="Muli"/>
+            </a:endParaRPr>
+          </a:p>
+          <a:p>
+            <a:pPr algn="ctr">
+              <a:buSzPts val="2400"/>
+            </a:pPr>
+            <a:r>
+              <a:rPr lang="en-US" sz="2400" dirty="0">
+                <a:solidFill>
+                  <a:srgbClr val="9900FF"/>
+                </a:solidFill>
+                <a:latin typeface="Muli"/>
+                <a:sym typeface="Muli"/>
+              </a:rPr>
+              <a:t>Another important 'lesser' </a:t>
+            </a:r>
+            <a:r>
+              <a:rPr lang="en-US" sz="2400" dirty="0" err="1">
+                <a:solidFill>
+                  <a:srgbClr val="9900FF"/>
+                </a:solidFill>
+                <a:latin typeface="Muli"/>
+                <a:sym typeface="Muli"/>
+              </a:rPr>
+              <a:t>charateristic</a:t>
+            </a:r>
+            <a:r>
+              <a:rPr lang="en-US" sz="2400" dirty="0">
+                <a:solidFill>
+                  <a:srgbClr val="9900FF"/>
+                </a:solidFill>
+                <a:latin typeface="Muli"/>
+                <a:sym typeface="Muli"/>
+              </a:rPr>
+              <a:t> is that VIX has a strong negative correlation to the S&amp;P 500, tending to rise when the stock market dives, and vice versa, and as such futures based on the VIX, traded at the CBOE (retail buyers hardly use CBOE since its been designed for large institutional investors), can be an effective vehicle for hedging stock market positions </a:t>
+            </a:r>
+          </a:p>
+          <a:p>
+            <a:pPr algn="ctr">
+              <a:buSzPts val="2400"/>
+            </a:pPr>
+            <a:endParaRPr lang="en-US" sz="2400" dirty="0">
+              <a:solidFill>
+                <a:srgbClr val="9900FF"/>
+              </a:solidFill>
+              <a:latin typeface="Muli"/>
+              <a:sym typeface="Muli"/>
+            </a:endParaRPr>
+          </a:p>
+          <a:p>
+            <a:pPr algn="ctr">
+              <a:buSzPts val="2400"/>
+            </a:pPr>
+            <a:r>
+              <a:rPr lang="en-US" sz="2400" dirty="0">
+                <a:solidFill>
+                  <a:srgbClr val="9900FF"/>
+                </a:solidFill>
+                <a:latin typeface="Muli"/>
+                <a:sym typeface="Muli"/>
+              </a:rPr>
+              <a:t>### Steps to Solutioning ###</a:t>
+            </a:r>
+          </a:p>
+          <a:p>
+            <a:pPr algn="ctr">
+              <a:buSzPts val="2400"/>
+            </a:pPr>
+            <a:endParaRPr lang="en-US" sz="2400" dirty="0">
+              <a:solidFill>
+                <a:srgbClr val="9900FF"/>
+              </a:solidFill>
+              <a:latin typeface="Muli"/>
+              <a:sym typeface="Muli"/>
+            </a:endParaRPr>
+          </a:p>
+          <a:p>
+            <a:pPr algn="ctr">
+              <a:buSzPts val="2400"/>
+            </a:pPr>
+            <a:r>
+              <a:rPr lang="en-US" sz="2400" dirty="0">
+                <a:solidFill>
+                  <a:srgbClr val="9900FF"/>
+                </a:solidFill>
+                <a:latin typeface="Muli"/>
+                <a:sym typeface="Muli"/>
+              </a:rPr>
+              <a:t>1. Data Gathering - I </a:t>
+            </a:r>
+            <a:r>
+              <a:rPr lang="en-US" sz="2400" dirty="0" err="1">
+                <a:solidFill>
+                  <a:srgbClr val="9900FF"/>
+                </a:solidFill>
+                <a:latin typeface="Muli"/>
+                <a:sym typeface="Muli"/>
+              </a:rPr>
+              <a:t>webscraped</a:t>
+            </a:r>
+            <a:r>
+              <a:rPr lang="en-US" sz="2400" dirty="0">
+                <a:solidFill>
+                  <a:srgbClr val="9900FF"/>
+                </a:solidFill>
+                <a:latin typeface="Muli"/>
+                <a:sym typeface="Muli"/>
+              </a:rPr>
+              <a:t> 2517 observations for daily adjusted closing prices of VIX starting '2010-06-23' to '2020-06-24' to build the volatility predictor. gathered data was stored in a 'pickle'. </a:t>
+            </a:r>
+          </a:p>
+          <a:p>
+            <a:pPr algn="ctr">
+              <a:buSzPts val="2400"/>
+            </a:pPr>
+            <a:endParaRPr lang="en-US" sz="2400" dirty="0">
+              <a:solidFill>
+                <a:srgbClr val="9900FF"/>
+              </a:solidFill>
+              <a:latin typeface="Muli"/>
+              <a:sym typeface="Muli"/>
+            </a:endParaRPr>
+          </a:p>
+          <a:p>
+            <a:pPr algn="ctr">
+              <a:buSzPts val="2400"/>
+            </a:pPr>
+            <a:r>
+              <a:rPr lang="en-US" sz="2400" dirty="0">
+                <a:solidFill>
+                  <a:srgbClr val="9900FF"/>
+                </a:solidFill>
+                <a:latin typeface="Muli"/>
+                <a:sym typeface="Muli"/>
+              </a:rPr>
+              <a:t>2. Data Pre-processing - Use of </a:t>
+            </a:r>
+            <a:r>
+              <a:rPr lang="en-US" sz="2400" dirty="0" err="1">
+                <a:solidFill>
+                  <a:srgbClr val="9900FF"/>
+                </a:solidFill>
+                <a:latin typeface="Muli"/>
+                <a:sym typeface="Muli"/>
+              </a:rPr>
+              <a:t>datetimestamp</a:t>
+            </a:r>
+            <a:r>
+              <a:rPr lang="en-US" sz="2400" dirty="0">
+                <a:solidFill>
+                  <a:srgbClr val="9900FF"/>
+                </a:solidFill>
+                <a:latin typeface="Muli"/>
+                <a:sym typeface="Muli"/>
+              </a:rPr>
+              <a:t> and index</a:t>
+            </a:r>
+          </a:p>
+          <a:p>
+            <a:pPr algn="ctr">
+              <a:buSzPts val="2400"/>
+            </a:pPr>
+            <a:endParaRPr lang="en-US" sz="2400" dirty="0">
+              <a:solidFill>
+                <a:srgbClr val="9900FF"/>
+              </a:solidFill>
+              <a:latin typeface="Muli"/>
+              <a:sym typeface="Muli"/>
+            </a:endParaRPr>
+          </a:p>
+          <a:p>
+            <a:pPr algn="ctr">
+              <a:buSzPts val="2400"/>
+            </a:pPr>
+            <a:r>
+              <a:rPr lang="en-US" sz="2400" dirty="0">
+                <a:solidFill>
+                  <a:srgbClr val="9900FF"/>
+                </a:solidFill>
+                <a:latin typeface="Muli"/>
+                <a:sym typeface="Muli"/>
+              </a:rPr>
+              <a:t>3. Exploratory Data Analysis </a:t>
+            </a:r>
+          </a:p>
+          <a:p>
+            <a:pPr algn="ctr">
+              <a:buSzPts val="2400"/>
+            </a:pPr>
+            <a:endParaRPr lang="en-US" sz="2400" dirty="0">
+              <a:solidFill>
+                <a:srgbClr val="9900FF"/>
+              </a:solidFill>
+              <a:latin typeface="Muli"/>
+              <a:sym typeface="Muli"/>
+            </a:endParaRPr>
+          </a:p>
+          <a:p>
+            <a:pPr algn="ctr">
+              <a:buSzPts val="2400"/>
+            </a:pPr>
+            <a:r>
+              <a:rPr lang="en-US" sz="2400" dirty="0">
+                <a:solidFill>
+                  <a:srgbClr val="9900FF"/>
+                </a:solidFill>
+                <a:latin typeface="Muli"/>
+                <a:sym typeface="Muli"/>
+              </a:rPr>
+              <a:t>4. Model Development and </a:t>
+            </a:r>
+            <a:r>
+              <a:rPr lang="en-US" sz="2400" dirty="0" err="1">
+                <a:solidFill>
+                  <a:srgbClr val="9900FF"/>
+                </a:solidFill>
+                <a:latin typeface="Muli"/>
+                <a:sym typeface="Muli"/>
+              </a:rPr>
+              <a:t>Evalution</a:t>
+            </a:r>
+            <a:r>
+              <a:rPr lang="en-US" sz="2400" dirty="0">
+                <a:solidFill>
+                  <a:srgbClr val="9900FF"/>
+                </a:solidFill>
+                <a:latin typeface="Muli"/>
+                <a:sym typeface="Muli"/>
+              </a:rPr>
+              <a:t> Criteria (RMSE)</a:t>
+            </a:r>
+          </a:p>
+          <a:p>
+            <a:pPr algn="ctr">
+              <a:buSzPts val="2400"/>
+            </a:pPr>
+            <a:r>
+              <a:rPr lang="en-US" sz="2400" dirty="0">
+                <a:solidFill>
+                  <a:srgbClr val="9900FF"/>
+                </a:solidFill>
+                <a:latin typeface="Muli"/>
+                <a:sym typeface="Muli"/>
+              </a:rPr>
+              <a:t>    1. Baseline - Persistence Model</a:t>
+            </a:r>
+          </a:p>
+          <a:p>
+            <a:pPr algn="ctr">
+              <a:buSzPts val="2400"/>
+            </a:pPr>
+            <a:r>
+              <a:rPr lang="en-US" sz="2400" dirty="0">
+                <a:solidFill>
+                  <a:srgbClr val="9900FF"/>
+                </a:solidFill>
+                <a:latin typeface="Muli"/>
+                <a:sym typeface="Muli"/>
+              </a:rPr>
+              <a:t>    2. Facebook Prophet </a:t>
+            </a:r>
+          </a:p>
+          <a:p>
+            <a:pPr algn="ctr">
+              <a:buSzPts val="2400"/>
+            </a:pPr>
+            <a:r>
+              <a:rPr lang="en-US" sz="2400" dirty="0">
+                <a:solidFill>
+                  <a:srgbClr val="9900FF"/>
+                </a:solidFill>
+                <a:latin typeface="Muli"/>
+                <a:sym typeface="Muli"/>
+              </a:rPr>
+              <a:t>    3. ARIMA</a:t>
+            </a:r>
+          </a:p>
+          <a:p>
+            <a:pPr algn="ctr">
+              <a:buSzPts val="2400"/>
+            </a:pPr>
+            <a:r>
+              <a:rPr lang="en-US" sz="2400" dirty="0">
+                <a:solidFill>
+                  <a:srgbClr val="9900FF"/>
+                </a:solidFill>
+                <a:latin typeface="Muli"/>
+                <a:sym typeface="Muli"/>
+              </a:rPr>
+              <a:t>    4. LSTM (for final presentation)</a:t>
+            </a:r>
+          </a:p>
+          <a:p>
+            <a:pPr algn="ctr">
+              <a:buSzPts val="2400"/>
+            </a:pPr>
+            <a:endParaRPr lang="en-US" sz="2400" dirty="0">
+              <a:solidFill>
+                <a:srgbClr val="9900FF"/>
+              </a:solidFill>
+              <a:latin typeface="Muli"/>
+              <a:sym typeface="Muli"/>
+            </a:endParaRPr>
+          </a:p>
+          <a:p>
+            <a:pPr algn="ctr">
+              <a:buSzPts val="2400"/>
+            </a:pPr>
+            <a:r>
+              <a:rPr lang="en-US" sz="2400" dirty="0">
+                <a:solidFill>
+                  <a:srgbClr val="9900FF"/>
+                </a:solidFill>
+                <a:latin typeface="Muli"/>
+                <a:sym typeface="Muli"/>
+              </a:rPr>
+              <a:t>5. Choice of Preferred Predictor Explained - the best performing model is the baseline - Persistence Model with a RMSE of 3.34 - I'm hoping the LSTM can outperform the baseline model  </a:t>
+            </a:r>
+          </a:p>
+          <a:p>
+            <a:pPr algn="ctr">
+              <a:buSzPts val="2400"/>
+            </a:pPr>
+            <a:endParaRPr lang="en-US" sz="2400" dirty="0">
+              <a:solidFill>
+                <a:srgbClr val="9900FF"/>
+              </a:solidFill>
+              <a:latin typeface="Muli"/>
+              <a:sym typeface="Muli"/>
+            </a:endParaRPr>
+          </a:p>
+          <a:p>
+            <a:pPr algn="ctr">
+              <a:buSzPts val="2400"/>
+            </a:pPr>
+            <a:r>
+              <a:rPr lang="en-US" sz="2400" dirty="0">
+                <a:solidFill>
+                  <a:srgbClr val="9900FF"/>
+                </a:solidFill>
+                <a:latin typeface="Muli"/>
+                <a:sym typeface="Muli"/>
+              </a:rPr>
+              <a:t>### Key Findings about the VIX ###</a:t>
+            </a:r>
+          </a:p>
+          <a:p>
+            <a:pPr algn="ctr">
+              <a:buSzPts val="2400"/>
+            </a:pPr>
+            <a:r>
+              <a:rPr lang="en-US" sz="2400" dirty="0">
+                <a:solidFill>
+                  <a:srgbClr val="9900FF"/>
+                </a:solidFill>
+                <a:latin typeface="Muli"/>
+                <a:sym typeface="Muli"/>
+              </a:rPr>
+              <a:t>1. Mean ~ 17 with Standard Deviation - ~7</a:t>
+            </a:r>
+          </a:p>
+          <a:p>
+            <a:pPr algn="ctr">
+              <a:buSzPts val="2400"/>
+            </a:pPr>
+            <a:r>
+              <a:rPr lang="en-US" sz="2400" dirty="0">
+                <a:solidFill>
+                  <a:srgbClr val="9900FF"/>
+                </a:solidFill>
+                <a:latin typeface="Muli"/>
+                <a:sym typeface="Muli"/>
+              </a:rPr>
+              <a:t>2. Highest recorded value - ~82 (March 2020 - peak of market meltdown in response to Covid19 lockdown)</a:t>
+            </a:r>
+          </a:p>
+          <a:p>
+            <a:pPr algn="ctr">
+              <a:buSzPts val="2400"/>
+            </a:pPr>
+            <a:r>
+              <a:rPr lang="en-US" sz="2400" dirty="0">
+                <a:solidFill>
+                  <a:srgbClr val="9900FF"/>
+                </a:solidFill>
+                <a:latin typeface="Muli"/>
+                <a:sym typeface="Muli"/>
+              </a:rPr>
+              <a:t>3. End of Q1 &amp; Q2 see most volatility - End of a critical Q2 is upon us!!!</a:t>
+            </a:r>
+          </a:p>
+          <a:p>
+            <a:pPr algn="ctr">
+              <a:buSzPts val="2400"/>
+            </a:pPr>
+            <a:r>
+              <a:rPr lang="en-US" sz="2400" dirty="0">
+                <a:solidFill>
+                  <a:srgbClr val="9900FF"/>
+                </a:solidFill>
+                <a:latin typeface="Muli"/>
+                <a:sym typeface="Muli"/>
+              </a:rPr>
+              <a:t>4. Elections (We have a big one coming up) result in a spike in volatility </a:t>
+            </a:r>
+          </a:p>
+          <a:p>
+            <a:pPr algn="ctr">
+              <a:buSzPts val="2400"/>
+            </a:pPr>
+            <a:r>
+              <a:rPr lang="en-US" sz="2400" dirty="0">
+                <a:solidFill>
+                  <a:srgbClr val="9900FF"/>
+                </a:solidFill>
+                <a:latin typeface="Muli"/>
+                <a:sym typeface="Muli"/>
+              </a:rPr>
+              <a:t>5. Relative rate of change in volatility needs to factored in building models that use short term change in VIX to predict  </a:t>
+            </a:r>
+          </a:p>
+          <a:p>
+            <a:pPr algn="ctr">
+              <a:buSzPts val="2400"/>
+            </a:pPr>
+            <a:endParaRPr lang="en-US" sz="2400" dirty="0">
+              <a:solidFill>
+                <a:srgbClr val="9900FF"/>
+              </a:solidFill>
+              <a:latin typeface="Muli"/>
+              <a:sym typeface="Muli"/>
+            </a:endParaRPr>
+          </a:p>
+          <a:p>
+            <a:pPr algn="ctr">
+              <a:buSzPts val="2400"/>
+            </a:pPr>
+            <a:r>
+              <a:rPr lang="en-US" sz="2400" dirty="0">
+                <a:solidFill>
+                  <a:srgbClr val="9900FF"/>
+                </a:solidFill>
+                <a:latin typeface="Muli"/>
+                <a:sym typeface="Muli"/>
+              </a:rPr>
+              <a:t>### Future Steps ###</a:t>
+            </a:r>
+          </a:p>
+          <a:p>
+            <a:pPr algn="ctr">
+              <a:buSzPts val="2400"/>
+            </a:pPr>
+            <a:endParaRPr lang="en-US" sz="2400" dirty="0">
+              <a:solidFill>
+                <a:srgbClr val="9900FF"/>
+              </a:solidFill>
+              <a:latin typeface="Muli"/>
+              <a:sym typeface="Muli"/>
+            </a:endParaRPr>
+          </a:p>
+          <a:p>
+            <a:pPr algn="ctr">
+              <a:buSzPts val="2400"/>
+            </a:pPr>
+            <a:r>
+              <a:rPr lang="en-US" sz="2400" dirty="0">
+                <a:solidFill>
+                  <a:srgbClr val="9900FF"/>
+                </a:solidFill>
+                <a:latin typeface="Muli"/>
+                <a:sym typeface="Muli"/>
+              </a:rPr>
+              <a:t>Each VIX index value represents an implied annual volatility for the S&amp;P500. So a VIX of 16 implies an annual implied change (up or down) of 16% in the S&amp;P</a:t>
+            </a:r>
+          </a:p>
+          <a:p>
+            <a:pPr algn="ctr">
+              <a:buSzPts val="2400"/>
+            </a:pPr>
+            <a:endParaRPr lang="en-US" sz="2400" dirty="0">
+              <a:solidFill>
+                <a:srgbClr val="9900FF"/>
+              </a:solidFill>
+              <a:latin typeface="Muli"/>
+              <a:sym typeface="Muli"/>
+            </a:endParaRPr>
+          </a:p>
+          <a:p>
+            <a:pPr algn="ctr">
+              <a:buSzPts val="2400"/>
+            </a:pPr>
+            <a:r>
+              <a:rPr lang="en-US" sz="2400" dirty="0">
+                <a:solidFill>
+                  <a:srgbClr val="9900FF"/>
+                </a:solidFill>
+                <a:latin typeface="Muli"/>
+                <a:sym typeface="Muli"/>
+              </a:rPr>
+              <a:t>For a day trader/scalper/swing trader, this 16% implied annual volatility remains </a:t>
+            </a:r>
+            <a:r>
+              <a:rPr lang="en-US" sz="2400" dirty="0" err="1">
+                <a:solidFill>
+                  <a:srgbClr val="9900FF"/>
+                </a:solidFill>
+                <a:latin typeface="Muli"/>
+                <a:sym typeface="Muli"/>
+              </a:rPr>
+              <a:t>instrutable</a:t>
+            </a:r>
+            <a:r>
+              <a:rPr lang="en-US" sz="2400" dirty="0">
+                <a:solidFill>
+                  <a:srgbClr val="9900FF"/>
+                </a:solidFill>
+                <a:latin typeface="Muli"/>
+                <a:sym typeface="Muli"/>
+              </a:rPr>
+              <a:t> however when converted into a daily implied movement of ~1 % (16/sqrt(252)), things start to make sense. Within periods of high volatility movement (Incremental bands of 10), scalpers can look to make anywhere from 1-5% unleveraged returns over a 3-4 period (provided they make the right picks of course) </a:t>
+            </a:r>
+          </a:p>
+          <a:p>
+            <a:pPr algn="ctr">
+              <a:buSzPts val="2400"/>
+            </a:pPr>
+            <a:endParaRPr lang="en-US" sz="2400" dirty="0">
+              <a:solidFill>
+                <a:srgbClr val="9900FF"/>
+              </a:solidFill>
+              <a:latin typeface="Muli"/>
+              <a:sym typeface="Muli"/>
+            </a:endParaRPr>
+          </a:p>
+          <a:p>
+            <a:pPr algn="ctr">
+              <a:buSzPts val="2400"/>
+            </a:pPr>
+            <a:r>
+              <a:rPr lang="en-US" sz="2400" dirty="0">
+                <a:solidFill>
+                  <a:srgbClr val="9900FF"/>
+                </a:solidFill>
+                <a:latin typeface="Muli"/>
+                <a:sym typeface="Muli"/>
+              </a:rPr>
+              <a:t>Stock picking itself will </a:t>
+            </a:r>
+          </a:p>
+          <a:p>
+            <a:pPr algn="ctr">
+              <a:buSzPts val="2400"/>
+            </a:pPr>
+            <a:endParaRPr lang="en-US" sz="2400" dirty="0">
+              <a:solidFill>
+                <a:srgbClr val="9900FF"/>
+              </a:solidFill>
+              <a:latin typeface="Muli"/>
+              <a:sym typeface="Muli"/>
+            </a:endParaRPr>
+          </a:p>
+          <a:p>
+            <a:pPr algn="ctr">
+              <a:buSzPts val="2400"/>
+            </a:pPr>
+            <a:endParaRPr lang="en-US" sz="2400" dirty="0">
+              <a:solidFill>
+                <a:srgbClr val="9900FF"/>
+              </a:solidFill>
+              <a:latin typeface="Muli"/>
+              <a:sym typeface="Muli"/>
+            </a:endParaRPr>
+          </a:p>
+          <a:p>
+            <a:pPr algn="ctr">
+              <a:buSzPts val="2400"/>
+            </a:pPr>
+            <a:r>
+              <a:rPr lang="en-US" sz="2400" dirty="0">
+                <a:solidFill>
+                  <a:srgbClr val="9900FF"/>
+                </a:solidFill>
+                <a:latin typeface="Muli"/>
+                <a:sym typeface="Muli"/>
+              </a:rPr>
+              <a:t>Defend - 70% weight to VIX Predictor + 30% weight to </a:t>
+            </a:r>
+          </a:p>
+          <a:p>
+            <a:pPr algn="ctr">
+              <a:buSzPts val="2400"/>
+            </a:pPr>
+            <a:endParaRPr lang="en-US" sz="2400" dirty="0">
+              <a:solidFill>
+                <a:srgbClr val="9900FF"/>
+              </a:solidFill>
+              <a:latin typeface="Muli"/>
+              <a:sym typeface="Muli"/>
+            </a:endParaRPr>
+          </a:p>
+          <a:p>
+            <a:pPr algn="ctr">
+              <a:buSzPts val="2400"/>
+            </a:pPr>
+            <a:r>
+              <a:rPr lang="en-US" sz="2400" dirty="0">
+                <a:solidFill>
+                  <a:srgbClr val="9900FF"/>
+                </a:solidFill>
+                <a:latin typeface="Muli"/>
+                <a:sym typeface="Muli"/>
+              </a:rPr>
+              <a:t>Hardball</a:t>
+            </a:r>
+          </a:p>
+          <a:p>
+            <a:pPr algn="ctr">
+              <a:buSzPts val="2400"/>
+            </a:pPr>
+            <a:endParaRPr lang="en-US" sz="2400" dirty="0">
+              <a:solidFill>
+                <a:srgbClr val="9900FF"/>
+              </a:solidFill>
+              <a:latin typeface="Muli"/>
+              <a:sym typeface="Muli"/>
+            </a:endParaRPr>
+          </a:p>
+          <a:p>
+            <a:pPr algn="ctr">
+              <a:buSzPts val="2400"/>
+            </a:pPr>
+            <a:r>
+              <a:rPr lang="en-US" sz="2400" dirty="0">
+                <a:solidFill>
+                  <a:srgbClr val="9900FF"/>
+                </a:solidFill>
+                <a:latin typeface="Muli"/>
+                <a:sym typeface="Muli"/>
+              </a:rPr>
+              <a:t>Attack (Chase stocks with highest delta weighed by a 'barometric' measure of noise around companies - follow the noise and hope it works out) </a:t>
+            </a:r>
+          </a:p>
+          <a:p>
+            <a:pPr algn="ctr">
+              <a:buSzPts val="2400"/>
+            </a:pPr>
+            <a:endParaRPr lang="en-US" sz="2400" dirty="0">
+              <a:solidFill>
+                <a:srgbClr val="9900FF"/>
+              </a:solidFill>
+              <a:latin typeface="Muli"/>
+              <a:sym typeface="Muli"/>
+            </a:endParaRPr>
+          </a:p>
+          <a:p>
+            <a:pPr algn="ctr">
+              <a:buSzPts val="2400"/>
+            </a:pPr>
+            <a:r>
+              <a:rPr lang="en-US" sz="2400" dirty="0">
+                <a:solidFill>
+                  <a:srgbClr val="9900FF"/>
+                </a:solidFill>
+                <a:latin typeface="Muli"/>
+                <a:sym typeface="Muli"/>
+              </a:rPr>
+              <a:t>3rd most critical input - and most exciting challenge would be trading volumes to estimate  (how much incremental change is happening in stock due to rebalancing of futures markets)</a:t>
+            </a:r>
+          </a:p>
+          <a:p>
+            <a:pPr algn="ctr">
+              <a:buSzPts val="2400"/>
+            </a:pPr>
+            <a:endParaRPr lang="en-US" sz="2400" dirty="0">
+              <a:solidFill>
+                <a:srgbClr val="9900FF"/>
+              </a:solidFill>
+              <a:latin typeface="Muli"/>
+              <a:sym typeface="Muli"/>
+            </a:endParaRPr>
+          </a:p>
+          <a:p>
+            <a:pPr algn="ctr">
+              <a:buSzPts val="2400"/>
+            </a:pPr>
+            <a:r>
+              <a:rPr lang="en-US" sz="2400" dirty="0">
+                <a:solidFill>
+                  <a:srgbClr val="9900FF"/>
+                </a:solidFill>
+                <a:latin typeface="Muli"/>
+                <a:sym typeface="Muli"/>
+              </a:rPr>
+              <a:t>I aim to fine-tune the predictor and identify critical thresholds that can serve as 'triggers' for traders (subscribing to my app). Alerts would be generated when 'relative' volatility changes help identify start of high 'fear' cycles aka buying opportunities and low 'fear' cycles aka sell high and sit on cash </a:t>
+            </a:r>
+          </a:p>
+          <a:p>
+            <a:pPr algn="ctr">
+              <a:buSzPts val="2400"/>
+            </a:pPr>
+            <a:endParaRPr lang="en-US" sz="2400" dirty="0">
+              <a:solidFill>
+                <a:srgbClr val="9900FF"/>
+              </a:solidFill>
+              <a:latin typeface="Muli"/>
+              <a:sym typeface="Muli"/>
+            </a:endParaRPr>
+          </a:p>
+          <a:p>
+            <a:pPr algn="ctr">
+              <a:buSzPts val="2400"/>
+            </a:pPr>
+            <a:r>
+              <a:rPr lang="en-US" sz="2400" dirty="0">
+                <a:solidFill>
+                  <a:srgbClr val="9900FF"/>
+                </a:solidFill>
+                <a:latin typeface="Muli"/>
+                <a:sym typeface="Muli"/>
+              </a:rPr>
+              <a:t>The END GOAL - develop a combinatory model that weighs 3 primary indicators of volatility - 15 day rolling prediction based on an series of LSTM's that predict for narrow bands of movement </a:t>
+            </a:r>
+            <a:r>
+              <a:rPr lang="en-US" sz="2400" dirty="0" err="1">
+                <a:solidFill>
+                  <a:srgbClr val="9900FF"/>
+                </a:solidFill>
+                <a:latin typeface="Muli"/>
+                <a:sym typeface="Muli"/>
+              </a:rPr>
+              <a:t>th</a:t>
+            </a:r>
+            <a:r>
+              <a:rPr lang="en-US" sz="2400" dirty="0">
+                <a:solidFill>
+                  <a:srgbClr val="9900FF"/>
+                </a:solidFill>
+                <a:latin typeface="Muli"/>
+                <a:sym typeface="Muli"/>
+              </a:rPr>
+              <a:t>  VIX to '</a:t>
+            </a:r>
+            <a:r>
+              <a:rPr lang="en-US" sz="2400" dirty="0" err="1">
+                <a:solidFill>
+                  <a:srgbClr val="9900FF"/>
+                </a:solidFill>
+                <a:latin typeface="Muli"/>
+                <a:sym typeface="Muli"/>
+              </a:rPr>
+              <a:t>magnitudely</a:t>
+            </a:r>
+            <a:r>
+              <a:rPr lang="en-US" sz="2400" dirty="0">
+                <a:solidFill>
+                  <a:srgbClr val="9900FF"/>
+                </a:solidFill>
+                <a:latin typeface="Muli"/>
+                <a:sym typeface="Muli"/>
+              </a:rPr>
+              <a:t>' predict market movements and then leave it to the sensibility of an average Joe to decide </a:t>
+            </a:r>
+            <a:r>
+              <a:rPr lang="en-US" sz="2400" dirty="0" err="1">
+                <a:solidFill>
+                  <a:srgbClr val="9900FF"/>
+                </a:solidFill>
+                <a:latin typeface="Muli"/>
+                <a:sym typeface="Muli"/>
+              </a:rPr>
+              <a:t>whats</a:t>
+            </a:r>
+            <a:r>
+              <a:rPr lang="en-US" sz="2400" dirty="0">
+                <a:solidFill>
+                  <a:srgbClr val="9900FF"/>
+                </a:solidFill>
+                <a:latin typeface="Muli"/>
+                <a:sym typeface="Muli"/>
+              </a:rPr>
+              <a:t> selling around him, </a:t>
+            </a:r>
+            <a:r>
+              <a:rPr lang="en-US" sz="2400" dirty="0" err="1">
+                <a:solidFill>
+                  <a:srgbClr val="9900FF"/>
+                </a:solidFill>
+                <a:latin typeface="Muli"/>
+                <a:sym typeface="Muli"/>
+              </a:rPr>
+              <a:t>whats</a:t>
+            </a:r>
+            <a:r>
+              <a:rPr lang="en-US" sz="2400" dirty="0">
+                <a:solidFill>
+                  <a:srgbClr val="9900FF"/>
+                </a:solidFill>
+                <a:latin typeface="Muli"/>
+                <a:sym typeface="Muli"/>
+              </a:rPr>
+              <a:t> not, who's talking about stuff more on their social media feeds, what are folks worried about!!! </a:t>
+            </a:r>
+            <a:r>
+              <a:rPr lang="en-US" sz="2400" dirty="0" err="1">
+                <a:solidFill>
+                  <a:srgbClr val="9900FF"/>
+                </a:solidFill>
+                <a:latin typeface="Muli"/>
+                <a:sym typeface="Muli"/>
+              </a:rPr>
+              <a:t>etc</a:t>
+            </a:r>
+            <a:r>
+              <a:rPr lang="en-US" sz="2400" dirty="0">
+                <a:solidFill>
+                  <a:srgbClr val="9900FF"/>
+                </a:solidFill>
+                <a:latin typeface="Muli"/>
+                <a:sym typeface="Muli"/>
+              </a:rPr>
+              <a:t> - "in rolling seas are </a:t>
+            </a:r>
+            <a:r>
+              <a:rPr lang="en-US" sz="2400" dirty="0" err="1">
+                <a:solidFill>
+                  <a:srgbClr val="9900FF"/>
+                </a:solidFill>
+                <a:latin typeface="Muli"/>
+                <a:sym typeface="Muli"/>
+              </a:rPr>
+              <a:t>magnificients</a:t>
+            </a:r>
+            <a:r>
+              <a:rPr lang="en-US" sz="2400" dirty="0">
+                <a:solidFill>
+                  <a:srgbClr val="9900FF"/>
+                </a:solidFill>
+                <a:latin typeface="Muli"/>
+                <a:sym typeface="Muli"/>
+              </a:rPr>
+              <a:t> beasts of the ocean found" (of course in the short run) so traders can factor in VIX into decision making</a:t>
+            </a:r>
+          </a:p>
+          <a:p>
+            <a:pPr algn="ctr">
+              <a:buSzPts val="2400"/>
+            </a:pPr>
+            <a:endParaRPr lang="en-US" sz="2400" dirty="0">
+              <a:solidFill>
+                <a:srgbClr val="9900FF"/>
+              </a:solidFill>
+              <a:latin typeface="Muli"/>
+              <a:sym typeface="Muli"/>
+            </a:endParaRPr>
+          </a:p>
+          <a:p>
+            <a:pPr algn="ctr">
+              <a:buSzPts val="2400"/>
+            </a:pPr>
+            <a:r>
+              <a:rPr lang="en-US" sz="2400" dirty="0">
+                <a:solidFill>
+                  <a:srgbClr val="9900FF"/>
+                </a:solidFill>
+                <a:latin typeface="Muli"/>
+                <a:sym typeface="Muli"/>
+              </a:rPr>
+              <a:t>To conclude:</a:t>
+            </a:r>
+          </a:p>
+          <a:p>
+            <a:pPr algn="ctr">
+              <a:buSzPts val="2400"/>
+            </a:pPr>
+            <a:endParaRPr lang="en-US" sz="2400" dirty="0">
+              <a:solidFill>
+                <a:srgbClr val="9900FF"/>
+              </a:solidFill>
+              <a:latin typeface="Muli"/>
+              <a:sym typeface="Muli"/>
+            </a:endParaRPr>
+          </a:p>
+          <a:p>
+            <a:pPr algn="ctr">
+              <a:buSzPts val="2400"/>
+            </a:pPr>
+            <a:r>
+              <a:rPr lang="en-US" sz="2400" dirty="0">
+                <a:solidFill>
+                  <a:srgbClr val="9900FF"/>
+                </a:solidFill>
+                <a:latin typeface="Muli"/>
+                <a:sym typeface="Muli"/>
+              </a:rPr>
+              <a:t>“My interest is in the future…I am going to spend the rest of my life there”</a:t>
+            </a:r>
+          </a:p>
+          <a:p>
+            <a:pPr algn="ctr">
+              <a:buSzPts val="2400"/>
+            </a:pPr>
+            <a:r>
+              <a:rPr lang="en-US" sz="2400" dirty="0">
+                <a:solidFill>
+                  <a:srgbClr val="9900FF"/>
+                </a:solidFill>
+                <a:latin typeface="Muli"/>
+                <a:sym typeface="Muli"/>
+              </a:rPr>
+              <a:t>– C.F. Kettering</a:t>
+            </a:r>
+          </a:p>
+          <a:p>
+            <a:pPr algn="ctr">
+              <a:buSzPts val="2400"/>
+            </a:pPr>
+            <a:endParaRPr lang="en-US" sz="2400" dirty="0">
+              <a:solidFill>
+                <a:srgbClr val="9900FF"/>
+              </a:solidFill>
+              <a:latin typeface="Muli"/>
+              <a:sym typeface="Muli"/>
+            </a:endParaRPr>
+          </a:p>
+          <a:p>
+            <a:pPr algn="ctr">
+              <a:buSzPts val="2400"/>
+            </a:pPr>
+            <a:r>
+              <a:rPr lang="en-US" sz="2400" dirty="0">
+                <a:solidFill>
+                  <a:srgbClr val="9900FF"/>
+                </a:solidFill>
+                <a:latin typeface="Muli"/>
+                <a:sym typeface="Muli"/>
+              </a:rPr>
+              <a:t>### Links to Presentation &amp; Academic Literature </a:t>
+            </a:r>
+          </a:p>
+          <a:p>
+            <a:pPr algn="ctr">
+              <a:buSzPts val="2400"/>
+            </a:pPr>
+            <a:r>
+              <a:rPr lang="en-US" sz="2400" dirty="0">
+                <a:solidFill>
+                  <a:srgbClr val="9900FF"/>
+                </a:solidFill>
+                <a:latin typeface="Muli"/>
+                <a:sym typeface="Muli"/>
+              </a:rPr>
+              <a:t>Presentation - https://</a:t>
+            </a:r>
+            <a:r>
+              <a:rPr lang="en-US" sz="2400" dirty="0" err="1">
+                <a:solidFill>
+                  <a:srgbClr val="9900FF"/>
+                </a:solidFill>
+                <a:latin typeface="Muli"/>
+                <a:sym typeface="Muli"/>
+              </a:rPr>
+              <a:t>docs.google.com</a:t>
+            </a:r>
+            <a:r>
+              <a:rPr lang="en-US" sz="2400" dirty="0">
+                <a:solidFill>
+                  <a:srgbClr val="9900FF"/>
+                </a:solidFill>
+                <a:latin typeface="Muli"/>
+                <a:sym typeface="Muli"/>
+              </a:rPr>
+              <a:t>/presentation/d/1ZFODWgJR_lD_ECELpOK0WLRsaTyFbnwPVT3cFBHadls/</a:t>
+            </a:r>
+            <a:r>
+              <a:rPr lang="en-US" sz="2400" dirty="0" err="1">
+                <a:solidFill>
+                  <a:srgbClr val="9900FF"/>
+                </a:solidFill>
+                <a:latin typeface="Muli"/>
+                <a:sym typeface="Muli"/>
+              </a:rPr>
+              <a:t>edit?usp</a:t>
+            </a:r>
+            <a:r>
+              <a:rPr lang="en-US" sz="2400" dirty="0">
+                <a:solidFill>
+                  <a:srgbClr val="9900FF"/>
+                </a:solidFill>
+                <a:latin typeface="Muli"/>
+                <a:sym typeface="Muli"/>
+              </a:rPr>
+              <a:t>=sharing</a:t>
+            </a:r>
+          </a:p>
+          <a:p>
+            <a:pPr algn="ctr">
+              <a:buSzPts val="2400"/>
+            </a:pPr>
+            <a:endParaRPr lang="en-US" sz="2400" dirty="0">
+              <a:solidFill>
+                <a:srgbClr val="9900FF"/>
+              </a:solidFill>
+              <a:latin typeface="Muli"/>
+              <a:sym typeface="Muli"/>
+            </a:endParaRPr>
+          </a:p>
+          <a:p>
+            <a:pPr algn="ctr">
+              <a:buSzPts val="2400"/>
+            </a:pPr>
+            <a:r>
+              <a:rPr lang="en-US" sz="2400" dirty="0">
+                <a:solidFill>
+                  <a:srgbClr val="9900FF"/>
+                </a:solidFill>
+                <a:latin typeface="Muli"/>
+                <a:sym typeface="Muli"/>
+              </a:rPr>
+              <a:t>Articles Reviewed  </a:t>
+            </a:r>
+          </a:p>
+          <a:p>
+            <a:pPr algn="ctr">
+              <a:buSzPts val="2400"/>
+            </a:pPr>
+            <a:r>
+              <a:rPr lang="en-US" sz="2400" dirty="0">
+                <a:solidFill>
+                  <a:srgbClr val="9900FF"/>
+                </a:solidFill>
+                <a:latin typeface="Muli"/>
+                <a:sym typeface="Muli"/>
+              </a:rPr>
+              <a:t>1. General Overview </a:t>
+            </a:r>
+          </a:p>
+          <a:p>
+            <a:pPr algn="ctr">
+              <a:buSzPts val="2400"/>
+            </a:pPr>
+            <a:r>
+              <a:rPr lang="en-US" sz="2400" dirty="0">
+                <a:solidFill>
+                  <a:srgbClr val="9900FF"/>
+                </a:solidFill>
+                <a:latin typeface="Muli"/>
+                <a:sym typeface="Muli"/>
+              </a:rPr>
+              <a:t>- https://</a:t>
+            </a:r>
+            <a:r>
+              <a:rPr lang="en-US" sz="2400" dirty="0" err="1">
+                <a:solidFill>
+                  <a:srgbClr val="9900FF"/>
+                </a:solidFill>
+                <a:latin typeface="Muli"/>
+                <a:sym typeface="Muli"/>
+              </a:rPr>
+              <a:t>www.spglobal.com</a:t>
+            </a:r>
+            <a:r>
+              <a:rPr lang="en-US" sz="2400" dirty="0">
+                <a:solidFill>
+                  <a:srgbClr val="9900FF"/>
+                </a:solidFill>
+                <a:latin typeface="Muli"/>
+                <a:sym typeface="Muli"/>
+              </a:rPr>
+              <a:t>/</a:t>
+            </a:r>
+            <a:r>
+              <a:rPr lang="en-US" sz="2400" dirty="0" err="1">
+                <a:solidFill>
+                  <a:srgbClr val="9900FF"/>
+                </a:solidFill>
+                <a:latin typeface="Muli"/>
+                <a:sym typeface="Muli"/>
+              </a:rPr>
+              <a:t>spdji</a:t>
+            </a:r>
+            <a:r>
+              <a:rPr lang="en-US" sz="2400" dirty="0">
+                <a:solidFill>
+                  <a:srgbClr val="9900FF"/>
+                </a:solidFill>
+                <a:latin typeface="Muli"/>
+                <a:sym typeface="Muli"/>
+              </a:rPr>
+              <a:t>/</a:t>
+            </a:r>
+            <a:r>
+              <a:rPr lang="en-US" sz="2400" dirty="0" err="1">
+                <a:solidFill>
+                  <a:srgbClr val="9900FF"/>
+                </a:solidFill>
+                <a:latin typeface="Muli"/>
+                <a:sym typeface="Muli"/>
+              </a:rPr>
+              <a:t>en</a:t>
+            </a:r>
+            <a:r>
+              <a:rPr lang="en-US" sz="2400" dirty="0">
+                <a:solidFill>
+                  <a:srgbClr val="9900FF"/>
+                </a:solidFill>
+                <a:latin typeface="Muli"/>
+                <a:sym typeface="Muli"/>
+              </a:rPr>
+              <a:t>/education-a-practitioners-guide-to-reading-</a:t>
+            </a:r>
+            <a:r>
+              <a:rPr lang="en-US" sz="2400" dirty="0" err="1">
+                <a:solidFill>
+                  <a:srgbClr val="9900FF"/>
+                </a:solidFill>
+                <a:latin typeface="Muli"/>
+                <a:sym typeface="Muli"/>
+              </a:rPr>
+              <a:t>vix.pdf</a:t>
+            </a:r>
+            <a:endParaRPr lang="en-US" sz="2400" dirty="0">
+              <a:solidFill>
+                <a:srgbClr val="9900FF"/>
+              </a:solidFill>
+              <a:latin typeface="Muli"/>
+              <a:sym typeface="Muli"/>
+            </a:endParaRPr>
+          </a:p>
+          <a:p>
+            <a:pPr algn="ctr">
+              <a:buSzPts val="2400"/>
+            </a:pPr>
+            <a:r>
+              <a:rPr lang="en-US" sz="2400" dirty="0">
+                <a:solidFill>
+                  <a:srgbClr val="9900FF"/>
+                </a:solidFill>
+                <a:latin typeface="Muli"/>
+                <a:sym typeface="Muli"/>
+              </a:rPr>
+              <a:t>- https://</a:t>
+            </a:r>
+            <a:r>
+              <a:rPr lang="en-US" sz="2400" dirty="0" err="1">
+                <a:solidFill>
+                  <a:srgbClr val="9900FF"/>
+                </a:solidFill>
+                <a:latin typeface="Muli"/>
+                <a:sym typeface="Muli"/>
+              </a:rPr>
+              <a:t>www.investopedia.com</a:t>
+            </a:r>
+            <a:r>
+              <a:rPr lang="en-US" sz="2400" dirty="0">
+                <a:solidFill>
+                  <a:srgbClr val="9900FF"/>
+                </a:solidFill>
+                <a:latin typeface="Muli"/>
+                <a:sym typeface="Muli"/>
+              </a:rPr>
+              <a:t>/ask/answers/010915/volatility-good-thing-or-bad-thing-investors-point-view-and-why.asp</a:t>
+            </a:r>
+          </a:p>
+          <a:p>
+            <a:pPr algn="ctr">
+              <a:buSzPts val="2400"/>
+            </a:pPr>
+            <a:r>
+              <a:rPr lang="en-US" sz="2400" dirty="0">
+                <a:solidFill>
+                  <a:srgbClr val="9900FF"/>
+                </a:solidFill>
+                <a:latin typeface="Muli"/>
+                <a:sym typeface="Muli"/>
+              </a:rPr>
+              <a:t>- https://</a:t>
+            </a:r>
+            <a:r>
+              <a:rPr lang="en-US" sz="2400" dirty="0" err="1">
+                <a:solidFill>
+                  <a:srgbClr val="9900FF"/>
+                </a:solidFill>
+                <a:latin typeface="Muli"/>
+                <a:sym typeface="Muli"/>
+              </a:rPr>
+              <a:t>ftalphaville.ft.com</a:t>
+            </a:r>
+            <a:r>
+              <a:rPr lang="en-US" sz="2400" dirty="0">
+                <a:solidFill>
+                  <a:srgbClr val="9900FF"/>
+                </a:solidFill>
+                <a:latin typeface="Muli"/>
+                <a:sym typeface="Muli"/>
+              </a:rPr>
+              <a:t>/2018/02/28/1519839805000/An-abridged--illustrated-history-of-volatility/</a:t>
+            </a:r>
+          </a:p>
+          <a:p>
+            <a:pPr algn="ctr">
+              <a:buSzPts val="2400"/>
+            </a:pPr>
+            <a:endParaRPr lang="en-US" sz="2400" dirty="0">
+              <a:solidFill>
+                <a:srgbClr val="9900FF"/>
+              </a:solidFill>
+              <a:latin typeface="Muli"/>
+              <a:sym typeface="Muli"/>
+            </a:endParaRPr>
+          </a:p>
+          <a:p>
+            <a:pPr algn="ctr">
+              <a:buSzPts val="2400"/>
+            </a:pPr>
+            <a:r>
+              <a:rPr lang="en-US" sz="2400" dirty="0">
+                <a:solidFill>
+                  <a:srgbClr val="9900FF"/>
+                </a:solidFill>
+                <a:latin typeface="Muli"/>
+                <a:sym typeface="Muli"/>
+              </a:rPr>
+              <a:t>2. Weakness - https://</a:t>
+            </a:r>
+            <a:r>
+              <a:rPr lang="en-US" sz="2400" dirty="0" err="1">
+                <a:solidFill>
+                  <a:srgbClr val="9900FF"/>
+                </a:solidFill>
+                <a:latin typeface="Muli"/>
+                <a:sym typeface="Muli"/>
+              </a:rPr>
+              <a:t>www.barrons.com</a:t>
+            </a:r>
+            <a:r>
+              <a:rPr lang="en-US" sz="2400" dirty="0">
+                <a:solidFill>
+                  <a:srgbClr val="9900FF"/>
+                </a:solidFill>
+                <a:latin typeface="Muli"/>
+                <a:sym typeface="Muli"/>
+              </a:rPr>
+              <a:t>/articles/the-pros-and-cons-of-vix-the-markets-fear-gauge-1505942074</a:t>
+            </a:r>
+          </a:p>
+          <a:p>
+            <a:pPr algn="ctr">
+              <a:buSzPts val="2400"/>
+            </a:pPr>
+            <a:endParaRPr lang="en-US" sz="2400" dirty="0">
+              <a:solidFill>
+                <a:srgbClr val="9900FF"/>
+              </a:solidFill>
+              <a:latin typeface="Muli"/>
+              <a:sym typeface="Muli"/>
+            </a:endParaRPr>
+          </a:p>
+          <a:p>
+            <a:pPr algn="ctr">
+              <a:buSzPts val="2400"/>
+            </a:pPr>
+            <a:endParaRPr lang="en-US" sz="2400" dirty="0">
+              <a:solidFill>
+                <a:srgbClr val="9900FF"/>
+              </a:solidFill>
+              <a:latin typeface="Muli"/>
+              <a:sym typeface="Muli"/>
+            </a:endParaRPr>
+          </a:p>
+          <a:p>
+            <a:pPr algn="ctr">
+              <a:buSzPts val="2400"/>
+            </a:pPr>
+            <a:r>
+              <a:rPr lang="en-US" sz="2400" dirty="0">
+                <a:solidFill>
+                  <a:srgbClr val="9900FF"/>
+                </a:solidFill>
+                <a:latin typeface="Muli"/>
+                <a:sym typeface="Muli"/>
+              </a:rPr>
+              <a:t>### Sources for Code, Images </a:t>
+            </a:r>
+            <a:r>
+              <a:rPr lang="en-US" sz="2400" dirty="0" err="1">
+                <a:solidFill>
+                  <a:srgbClr val="9900FF"/>
+                </a:solidFill>
+                <a:latin typeface="Muli"/>
+                <a:sym typeface="Muli"/>
+              </a:rPr>
+              <a:t>etc</a:t>
+            </a:r>
+            <a:r>
+              <a:rPr lang="en-US" sz="2400" dirty="0">
+                <a:solidFill>
+                  <a:srgbClr val="9900FF"/>
+                </a:solidFill>
+                <a:latin typeface="Muli"/>
+                <a:sym typeface="Muli"/>
+              </a:rPr>
+              <a:t> ###</a:t>
+            </a:r>
+          </a:p>
+          <a:p>
+            <a:pPr algn="ctr">
+              <a:buSzPts val="2400"/>
+            </a:pPr>
+            <a:endParaRPr lang="en-US" sz="2400" dirty="0">
+              <a:solidFill>
+                <a:srgbClr val="9900FF"/>
+              </a:solidFill>
+              <a:latin typeface="Muli"/>
+              <a:sym typeface="Muli"/>
+            </a:endParaRPr>
+          </a:p>
+          <a:p>
+            <a:pPr algn="ctr">
+              <a:buSzPts val="2400"/>
+            </a:pPr>
+            <a:endParaRPr lang="en-US" sz="2400" dirty="0">
+              <a:solidFill>
+                <a:srgbClr val="9900FF"/>
+              </a:solidFill>
+              <a:latin typeface="Muli"/>
+              <a:sym typeface="Muli"/>
+            </a:endParaRPr>
+          </a:p>
+          <a:p>
+            <a:pPr algn="ctr">
+              <a:buSzPts val="2400"/>
+            </a:pPr>
             <a:endParaRPr sz="2400" dirty="0">
               <a:solidFill>
                 <a:srgbClr val="9900FF"/>
@@ -10951,7 +12879,7 @@
                 <a:cs typeface="Muli"/>
                 <a:sym typeface="Muli"/>
               </a:rPr>
-              <a:t>current investment reality </a:t>
+              <a:t>Current Investment Reality </a:t>
             </a:r>
             <a:endParaRPr sz="2400" dirty="0">
               <a:solidFill>
@@ -11321,7 +13249,7 @@
         </p:nvSpPr>
         <p:spPr>
           <a:xfrm>
-            <a:off x="1311965" y="192249"/>
+            <a:off x="1110249" y="192249"/>
             <a:ext cx="6591632" cy="558000"/>
           </a:xfrm>
           <a:prstGeom prst="rect">
@@ -11365,7 +13293,7 @@
                 <a:cs typeface="Muli"/>
                 <a:sym typeface="Muli"/>
               </a:rPr>
-              <a:t>beware danger lurks!</a:t>
+              <a:t>Beware - Danger Lurks!</a:t>
             </a:r>
             <a:endParaRPr sz="2400" dirty="0">
               <a:solidFill>
@@ -11808,7 +13736,7 @@
                 <a:cs typeface="Muli"/>
                 <a:sym typeface="Muli"/>
               </a:rPr>
-              <a:t>Key characteristic  - ‘long term mean reversion’</a:t>
+              <a:t>Key characteristics  - ‘long term mean reversion’ and ‘inversely co-related with S&amp;P500’</a:t>
             </a:r>
             <a:endParaRPr dirty="0">
               <a:solidFill>
@@ -16837,7 +18765,7 @@
               <a:rPr lang="en-US" dirty="0">
                 <a:sym typeface="Muli"/>
               </a:rPr>
-              <a:t> forecast </a:t>
+              <a:t> day forecast </a:t>
             </a:r>
           </a:p>
           <a:p>

</xml_diff>